<commit_message>
minor chnages from week 7 and 8
</commit_message>
<xml_diff>
--- a/Week8/W8.03. Creating Tables.pptx
+++ b/Week8/W8.03. Creating Tables.pptx
@@ -154,15 +154,38 @@
 </p:presentation>
 </file>
 
+<file path=ppt/revisionInfo.xml><?xml version="1.0" encoding="utf-8"?>
+<p1510:revInfo xmlns:a="http://schemas.openxmlformats.org/drawingml/2006/main" xmlns:r="http://schemas.openxmlformats.org/officeDocument/2006/relationships" xmlns:p1510="http://schemas.microsoft.com/office/powerpoint/2015/10/main">
+  <p1510:revLst>
+    <p1510:client id="{A8F2DEC5-02DC-4063-A126-75E15397B57B}" v="4" dt="2023-04-24T00:51:33.707"/>
+  </p1510:revLst>
+</p1510:revInfo>
+</file>
+
 <file path=ppt/changesInfos/changesInfo1.xml><?xml version="1.0" encoding="utf-8"?>
 <pc:chgInfo xmlns:a="http://schemas.openxmlformats.org/drawingml/2006/main" xmlns:r="http://schemas.openxmlformats.org/officeDocument/2006/relationships" xmlns:ac="http://schemas.microsoft.com/office/drawing/2013/main/command" xmlns:pc="http://schemas.microsoft.com/office/powerpoint/2013/main/command">
   <pc:docChgLst>
     <pc:chgData name="Charles Kiefriter" userId="a996b49251c4dfd2" providerId="LiveId" clId="{A8F2DEC5-02DC-4063-A126-75E15397B57B}"/>
     <pc:docChg chg="modSld">
-      <pc:chgData name="Charles Kiefriter" userId="a996b49251c4dfd2" providerId="LiveId" clId="{A8F2DEC5-02DC-4063-A126-75E15397B57B}" dt="2023-04-14T22:14:09.357" v="2" actId="1035"/>
+      <pc:chgData name="Charles Kiefriter" userId="a996b49251c4dfd2" providerId="LiveId" clId="{A8F2DEC5-02DC-4063-A126-75E15397B57B}" dt="2023-04-24T00:51:33.706" v="17"/>
       <pc:docMkLst>
         <pc:docMk/>
       </pc:docMkLst>
+      <pc:sldChg chg="modSp mod">
+        <pc:chgData name="Charles Kiefriter" userId="a996b49251c4dfd2" providerId="LiveId" clId="{A8F2DEC5-02DC-4063-A126-75E15397B57B}" dt="2023-04-20T17:58:40.666" v="4" actId="1035"/>
+        <pc:sldMkLst>
+          <pc:docMk/>
+          <pc:sldMk cId="507793010" sldId="256"/>
+        </pc:sldMkLst>
+        <pc:spChg chg="mod">
+          <ac:chgData name="Charles Kiefriter" userId="a996b49251c4dfd2" providerId="LiveId" clId="{A8F2DEC5-02DC-4063-A126-75E15397B57B}" dt="2023-04-20T17:58:40.666" v="4" actId="1035"/>
+          <ac:spMkLst>
+            <pc:docMk/>
+            <pc:sldMk cId="507793010" sldId="256"/>
+            <ac:spMk id="3" creationId="{756FD140-E406-4165-9E64-ECEE2E5D3174}"/>
+          </ac:spMkLst>
+        </pc:spChg>
+      </pc:sldChg>
       <pc:sldChg chg="modSp mod">
         <pc:chgData name="Charles Kiefriter" userId="a996b49251c4dfd2" providerId="LiveId" clId="{A8F2DEC5-02DC-4063-A126-75E15397B57B}" dt="2023-04-14T22:12:58.762" v="0" actId="1036"/>
         <pc:sldMkLst>
@@ -193,6 +216,66 @@
           </ac:spMkLst>
         </pc:spChg>
       </pc:sldChg>
+      <pc:sldChg chg="addSp modSp mod">
+        <pc:chgData name="Charles Kiefriter" userId="a996b49251c4dfd2" providerId="LiveId" clId="{A8F2DEC5-02DC-4063-A126-75E15397B57B}" dt="2023-04-24T00:37:51.006" v="12" actId="1076"/>
+        <pc:sldMkLst>
+          <pc:docMk/>
+          <pc:sldMk cId="1951832339" sldId="267"/>
+        </pc:sldMkLst>
+        <pc:spChg chg="add mod">
+          <ac:chgData name="Charles Kiefriter" userId="a996b49251c4dfd2" providerId="LiveId" clId="{A8F2DEC5-02DC-4063-A126-75E15397B57B}" dt="2023-04-24T00:37:51.006" v="12" actId="1076"/>
+          <ac:spMkLst>
+            <pc:docMk/>
+            <pc:sldMk cId="1951832339" sldId="267"/>
+            <ac:spMk id="4" creationId="{CC8CF15F-5444-049C-948E-4F011DB3FD52}"/>
+          </ac:spMkLst>
+        </pc:spChg>
+      </pc:sldChg>
+      <pc:sldChg chg="addSp modSp">
+        <pc:chgData name="Charles Kiefriter" userId="a996b49251c4dfd2" providerId="LiveId" clId="{A8F2DEC5-02DC-4063-A126-75E15397B57B}" dt="2023-04-24T00:51:33.706" v="17"/>
+        <pc:sldMkLst>
+          <pc:docMk/>
+          <pc:sldMk cId="3692636709" sldId="269"/>
+        </pc:sldMkLst>
+        <pc:spChg chg="add mod">
+          <ac:chgData name="Charles Kiefriter" userId="a996b49251c4dfd2" providerId="LiveId" clId="{A8F2DEC5-02DC-4063-A126-75E15397B57B}" dt="2023-04-24T00:51:33.706" v="17"/>
+          <ac:spMkLst>
+            <pc:docMk/>
+            <pc:sldMk cId="3692636709" sldId="269"/>
+            <ac:spMk id="4" creationId="{EBF3094F-31B5-BDA2-A2D3-C35D88F0785D}"/>
+          </ac:spMkLst>
+        </pc:spChg>
+      </pc:sldChg>
+      <pc:sldChg chg="addSp modSp">
+        <pc:chgData name="Charles Kiefriter" userId="a996b49251c4dfd2" providerId="LiveId" clId="{A8F2DEC5-02DC-4063-A126-75E15397B57B}" dt="2023-04-24T00:45:27.206" v="16"/>
+        <pc:sldMkLst>
+          <pc:docMk/>
+          <pc:sldMk cId="1226431186" sldId="270"/>
+        </pc:sldMkLst>
+        <pc:spChg chg="add mod">
+          <ac:chgData name="Charles Kiefriter" userId="a996b49251c4dfd2" providerId="LiveId" clId="{A8F2DEC5-02DC-4063-A126-75E15397B57B}" dt="2023-04-24T00:45:27.206" v="16"/>
+          <ac:spMkLst>
+            <pc:docMk/>
+            <pc:sldMk cId="1226431186" sldId="270"/>
+            <ac:spMk id="5" creationId="{2B8953F5-BDB5-4818-8391-C4745E626699}"/>
+          </ac:spMkLst>
+        </pc:spChg>
+      </pc:sldChg>
+      <pc:sldChg chg="addSp modSp mod">
+        <pc:chgData name="Charles Kiefriter" userId="a996b49251c4dfd2" providerId="LiveId" clId="{A8F2DEC5-02DC-4063-A126-75E15397B57B}" dt="2023-04-24T00:45:06.609" v="15" actId="14100"/>
+        <pc:sldMkLst>
+          <pc:docMk/>
+          <pc:sldMk cId="3317997303" sldId="271"/>
+        </pc:sldMkLst>
+        <pc:spChg chg="add mod">
+          <ac:chgData name="Charles Kiefriter" userId="a996b49251c4dfd2" providerId="LiveId" clId="{A8F2DEC5-02DC-4063-A126-75E15397B57B}" dt="2023-04-24T00:45:06.609" v="15" actId="14100"/>
+          <ac:spMkLst>
+            <pc:docMk/>
+            <pc:sldMk cId="3317997303" sldId="271"/>
+            <ac:spMk id="5" creationId="{87409C64-557F-2408-CBCC-BAD13FC978BC}"/>
+          </ac:spMkLst>
+        </pc:spChg>
+      </pc:sldChg>
     </pc:docChg>
   </pc:docChgLst>
 </pc:chgInfo>
@@ -280,7 +363,7 @@
           <a:p>
             <a:fld id="{BF1BC3E4-C956-40CB-AFCD-8F927AFF366E}" type="datetimeFigureOut">
               <a:rPr lang="en-US" smtClean="0"/>
-              <a:t>4/14/2023</a:t>
+              <a:t>4/20/2023</a:t>
             </a:fld>
             <a:endParaRPr lang="en-US"/>
           </a:p>
@@ -878,7 +961,7 @@
           <a:p>
             <a:fld id="{548C5E67-172B-4F6A-B3B9-DEF72F952E5B}" type="datetimeFigureOut">
               <a:rPr lang="en-US" smtClean="0"/>
-              <a:t>4/14/2023</a:t>
+              <a:t>4/20/2023</a:t>
             </a:fld>
             <a:endParaRPr lang="en-US"/>
           </a:p>
@@ -1082,7 +1165,7 @@
           <a:p>
             <a:fld id="{548C5E67-172B-4F6A-B3B9-DEF72F952E5B}" type="datetimeFigureOut">
               <a:rPr lang="en-US" smtClean="0"/>
-              <a:t>4/14/2023</a:t>
+              <a:t>4/20/2023</a:t>
             </a:fld>
             <a:endParaRPr lang="en-US"/>
           </a:p>
@@ -1276,7 +1359,7 @@
           <a:p>
             <a:fld id="{548C5E67-172B-4F6A-B3B9-DEF72F952E5B}" type="datetimeFigureOut">
               <a:rPr lang="en-US" smtClean="0"/>
-              <a:t>4/14/2023</a:t>
+              <a:t>4/20/2023</a:t>
             </a:fld>
             <a:endParaRPr lang="en-US"/>
           </a:p>
@@ -2321,7 +2404,7 @@
           <a:p>
             <a:fld id="{548C5E67-172B-4F6A-B3B9-DEF72F952E5B}" type="datetimeFigureOut">
               <a:rPr lang="en-US" smtClean="0"/>
-              <a:t>4/14/2023</a:t>
+              <a:t>4/20/2023</a:t>
             </a:fld>
             <a:endParaRPr lang="en-US"/>
           </a:p>
@@ -2602,7 +2685,7 @@
           <a:p>
             <a:fld id="{548C5E67-172B-4F6A-B3B9-DEF72F952E5B}" type="datetimeFigureOut">
               <a:rPr lang="en-US" smtClean="0"/>
-              <a:t>4/14/2023</a:t>
+              <a:t>4/20/2023</a:t>
             </a:fld>
             <a:endParaRPr lang="en-US"/>
           </a:p>
@@ -3164,7 +3247,12 @@
             <p:ph type="subTitle" idx="1"/>
           </p:nvPr>
         </p:nvSpPr>
-        <p:spPr/>
+        <p:spPr>
+          <a:xfrm>
+            <a:off x="1524000" y="3602038"/>
+            <a:ext cx="5909534" cy="1655762"/>
+          </a:xfrm>
+        </p:spPr>
         <p:txBody>
           <a:bodyPr/>
           <a:lstStyle/>
@@ -5029,6 +5117,44 @@
               <a:rPr lang="en-US" dirty="0"/>
               <a:t>Related tables are created last</a:t>
             </a:r>
+          </a:p>
+        </p:txBody>
+      </p:sp>
+      <p:sp>
+        <p:nvSpPr>
+          <p:cNvPr id="5" name="TextBox 4">
+            <a:extLst>
+              <a:ext uri="{FF2B5EF4-FFF2-40B4-BE49-F238E27FC236}">
+                <a16:creationId xmlns:a16="http://schemas.microsoft.com/office/drawing/2014/main" id="{87409C64-557F-2408-CBCC-BAD13FC978BC}"/>
+              </a:ext>
+            </a:extLst>
+          </p:cNvPr>
+          <p:cNvSpPr txBox="1"/>
+          <p:nvPr/>
+        </p:nvSpPr>
+        <p:spPr>
+          <a:xfrm>
+            <a:off x="1081278" y="5853797"/>
+            <a:ext cx="10272522" cy="369332"/>
+          </a:xfrm>
+          <a:prstGeom prst="rect">
+            <a:avLst/>
+          </a:prstGeom>
+          <a:noFill/>
+        </p:spPr>
+        <p:txBody>
+          <a:bodyPr wrap="square">
+            <a:spAutoFit/>
+          </a:bodyPr>
+          <a:lstStyle/>
+          <a:p>
+            <a:r>
+              <a:rPr lang="en-US" dirty="0">
+                <a:hlinkClick r:id="rId2"/>
+              </a:rPr>
+              <a:t>https://github.com/ckiefriter1/mysql-java-recipes/blob/main/src/main/resources/recipe_schema.sql</a:t>
+            </a:r>
+            <a:endParaRPr lang="en-US" dirty="0"/>
           </a:p>
         </p:txBody>
       </p:sp>
@@ -5365,6 +5491,44 @@
           </a:p>
         </p:txBody>
       </p:sp>
+      <p:sp>
+        <p:nvSpPr>
+          <p:cNvPr id="5" name="TextBox 4">
+            <a:extLst>
+              <a:ext uri="{FF2B5EF4-FFF2-40B4-BE49-F238E27FC236}">
+                <a16:creationId xmlns:a16="http://schemas.microsoft.com/office/drawing/2014/main" id="{2B8953F5-BDB5-4818-8391-C4745E626699}"/>
+              </a:ext>
+            </a:extLst>
+          </p:cNvPr>
+          <p:cNvSpPr txBox="1"/>
+          <p:nvPr/>
+        </p:nvSpPr>
+        <p:spPr>
+          <a:xfrm>
+            <a:off x="1081278" y="5853797"/>
+            <a:ext cx="10272522" cy="369332"/>
+          </a:xfrm>
+          <a:prstGeom prst="rect">
+            <a:avLst/>
+          </a:prstGeom>
+          <a:noFill/>
+        </p:spPr>
+        <p:txBody>
+          <a:bodyPr wrap="square">
+            <a:spAutoFit/>
+          </a:bodyPr>
+          <a:lstStyle/>
+          <a:p>
+            <a:r>
+              <a:rPr lang="en-US" dirty="0">
+                <a:hlinkClick r:id="rId2"/>
+              </a:rPr>
+              <a:t>https://github.com/ckiefriter1/mysql-java-recipes/blob/main/src/main/resources/recipe_schema.sql</a:t>
+            </a:r>
+            <a:endParaRPr lang="en-US" dirty="0"/>
+          </a:p>
+        </p:txBody>
+      </p:sp>
     </p:spTree>
     <p:extLst>
       <p:ext uri="{BB962C8B-B14F-4D97-AF65-F5344CB8AC3E}">
@@ -5456,6 +5620,44 @@
               <a:rPr lang="en-US" dirty="0"/>
               <a:t>: Add the CREATE TABLE statements</a:t>
             </a:r>
+          </a:p>
+        </p:txBody>
+      </p:sp>
+      <p:sp>
+        <p:nvSpPr>
+          <p:cNvPr id="4" name="TextBox 3">
+            <a:extLst>
+              <a:ext uri="{FF2B5EF4-FFF2-40B4-BE49-F238E27FC236}">
+                <a16:creationId xmlns:a16="http://schemas.microsoft.com/office/drawing/2014/main" id="{EBF3094F-31B5-BDA2-A2D3-C35D88F0785D}"/>
+              </a:ext>
+            </a:extLst>
+          </p:cNvPr>
+          <p:cNvSpPr txBox="1"/>
+          <p:nvPr/>
+        </p:nvSpPr>
+        <p:spPr>
+          <a:xfrm>
+            <a:off x="1081278" y="5853797"/>
+            <a:ext cx="10272522" cy="369332"/>
+          </a:xfrm>
+          <a:prstGeom prst="rect">
+            <a:avLst/>
+          </a:prstGeom>
+          <a:noFill/>
+        </p:spPr>
+        <p:txBody>
+          <a:bodyPr wrap="square">
+            <a:spAutoFit/>
+          </a:bodyPr>
+          <a:lstStyle/>
+          <a:p>
+            <a:r>
+              <a:rPr lang="en-US" dirty="0">
+                <a:hlinkClick r:id="rId2"/>
+              </a:rPr>
+              <a:t>https://github.com/ckiefriter1/mysql-java-recipes/blob/main/src/main/resources/recipe_schema.sql</a:t>
+            </a:r>
+            <a:endParaRPr lang="en-US" dirty="0"/>
           </a:p>
         </p:txBody>
       </p:sp>
@@ -6069,6 +6271,44 @@
           </a:fontRef>
         </p:style>
       </p:cxnSp>
+      <p:sp>
+        <p:nvSpPr>
+          <p:cNvPr id="4" name="TextBox 3">
+            <a:extLst>
+              <a:ext uri="{FF2B5EF4-FFF2-40B4-BE49-F238E27FC236}">
+                <a16:creationId xmlns:a16="http://schemas.microsoft.com/office/drawing/2014/main" id="{CC8CF15F-5444-049C-948E-4F011DB3FD52}"/>
+              </a:ext>
+            </a:extLst>
+          </p:cNvPr>
+          <p:cNvSpPr txBox="1"/>
+          <p:nvPr/>
+        </p:nvSpPr>
+        <p:spPr>
+          <a:xfrm>
+            <a:off x="698500" y="6123543"/>
+            <a:ext cx="11652250" cy="369332"/>
+          </a:xfrm>
+          <a:prstGeom prst="rect">
+            <a:avLst/>
+          </a:prstGeom>
+          <a:noFill/>
+        </p:spPr>
+        <p:txBody>
+          <a:bodyPr wrap="square">
+            <a:spAutoFit/>
+          </a:bodyPr>
+          <a:lstStyle/>
+          <a:p>
+            <a:r>
+              <a:rPr lang="en-US" dirty="0">
+                <a:hlinkClick r:id="rId3"/>
+              </a:rPr>
+              <a:t>https://github.com/ckiefriter1/mysql-java-recipes/blob/main/src/main/resources/Recipe-Database-Model.drawio.png</a:t>
+            </a:r>
+            <a:endParaRPr lang="en-US" dirty="0"/>
+          </a:p>
+        </p:txBody>
+      </p:sp>
     </p:spTree>
     <p:extLst>
       <p:ext uri="{BB962C8B-B14F-4D97-AF65-F5344CB8AC3E}">

</xml_diff>